<commit_message>
report basis added and small updates on presentation
</commit_message>
<xml_diff>
--- a/Health_Care_Bot.pptx
+++ b/Health_Care_Bot.pptx
@@ -5,10 +5,10 @@
     <p:sldMasterId id="2147483684" r:id="rId2"/>
   </p:sldMasterIdLst>
   <p:notesMasterIdLst>
-    <p:notesMasterId r:id="rId15"/>
+    <p:notesMasterId r:id="rId14"/>
   </p:notesMasterIdLst>
   <p:handoutMasterIdLst>
-    <p:handoutMasterId r:id="rId16"/>
+    <p:handoutMasterId r:id="rId15"/>
   </p:handoutMasterIdLst>
   <p:sldIdLst>
     <p:sldId id="280" r:id="rId3"/>
@@ -21,8 +21,7 @@
     <p:sldId id="274" r:id="rId10"/>
     <p:sldId id="282" r:id="rId11"/>
     <p:sldId id="275" r:id="rId12"/>
-    <p:sldId id="276" r:id="rId13"/>
-    <p:sldId id="277" r:id="rId14"/>
+    <p:sldId id="277" r:id="rId13"/>
   </p:sldIdLst>
   <p:sldSz cx="12192000" cy="6858000"/>
   <p:notesSz cx="6858000" cy="9144000"/>
@@ -143,6 +142,10 @@
 </p:presentation>
 </file>
 
+<file path=ppt/revisionInfo.xml><?xml version="1.0" encoding="utf-8"?>
+<p1510:revInfo xmlns:a="http://schemas.openxmlformats.org/drawingml/2006/main" xmlns:r="http://schemas.openxmlformats.org/officeDocument/2006/relationships" xmlns:p1510="http://schemas.microsoft.com/office/powerpoint/2015/10/main"/>
+</file>
+
 <file path=ppt/handoutMasters/handoutMaster1.xml><?xml version="1.0" encoding="utf-8"?>
 <p:handoutMaster xmlns:a="http://schemas.openxmlformats.org/drawingml/2006/main" xmlns:r="http://schemas.openxmlformats.org/officeDocument/2006/relationships" xmlns:p="http://schemas.openxmlformats.org/presentationml/2006/main">
   <p:cSld>
@@ -225,7 +228,7 @@
           <a:p>
             <a:fld id="{E5CB2E47-6F41-409B-AD22-834AE1EFF186}" type="datetimeFigureOut">
               <a:rPr lang="en-US" smtClean="0"/>
-              <a:t>25-May-17</a:t>
+              <a:t>29-May-17</a:t>
             </a:fld>
             <a:endParaRPr lang="en-US"/>
           </a:p>
@@ -390,7 +393,7 @@
           <a:p>
             <a:fld id="{FAD6744A-403D-42A1-BFE7-61DA46EE7C6C}" type="datetimeFigureOut">
               <a:rPr lang="en-US" smtClean="0"/>
-              <a:t>25-May-17</a:t>
+              <a:t>29-May-17</a:t>
             </a:fld>
             <a:endParaRPr lang="en-US"/>
           </a:p>
@@ -785,7 +788,7 @@
           <a:p>
             <a:fld id="{349BF3EA-1A78-4F07-BDC0-C8A1BD461199}" type="datetimeFigureOut">
               <a:rPr lang="en-US" smtClean="0"/>
-              <a:t>25-May-17</a:t>
+              <a:t>29-May-17</a:t>
             </a:fld>
             <a:endParaRPr lang="en-US"/>
           </a:p>
@@ -1193,7 +1196,7 @@
           <a:p>
             <a:fld id="{349BF3EA-1A78-4F07-BDC0-C8A1BD461199}" type="datetimeFigureOut">
               <a:rPr lang="en-US" smtClean="0"/>
-              <a:t>25-May-17</a:t>
+              <a:t>29-May-17</a:t>
             </a:fld>
             <a:endParaRPr lang="en-US"/>
           </a:p>
@@ -1322,7 +1325,7 @@
           <a:p>
             <a:fld id="{349BF3EA-1A78-4F07-BDC0-C8A1BD461199}" type="datetimeFigureOut">
               <a:rPr lang="en-US" smtClean="0"/>
-              <a:t>25-May-17</a:t>
+              <a:t>29-May-17</a:t>
             </a:fld>
             <a:endParaRPr lang="en-US"/>
           </a:p>
@@ -1513,7 +1516,7 @@
           <a:p>
             <a:fld id="{349BF3EA-1A78-4F07-BDC0-C8A1BD461199}" type="datetimeFigureOut">
               <a:rPr lang="en-US" smtClean="0"/>
-              <a:t>25-May-17</a:t>
+              <a:t>29-May-17</a:t>
             </a:fld>
             <a:endParaRPr lang="en-US"/>
           </a:p>
@@ -1793,7 +1796,7 @@
           <a:p>
             <a:fld id="{349BF3EA-1A78-4F07-BDC0-C8A1BD461199}" type="datetimeFigureOut">
               <a:rPr lang="en-US" smtClean="0"/>
-              <a:t>25-May-17</a:t>
+              <a:t>29-May-17</a:t>
             </a:fld>
             <a:endParaRPr lang="en-US"/>
           </a:p>
@@ -2162,7 +2165,7 @@
           <a:p>
             <a:fld id="{349BF3EA-1A78-4F07-BDC0-C8A1BD461199}" type="datetimeFigureOut">
               <a:rPr lang="en-US" smtClean="0"/>
-              <a:t>25-May-17</a:t>
+              <a:t>29-May-17</a:t>
             </a:fld>
             <a:endParaRPr lang="en-US"/>
           </a:p>
@@ -2405,7 +2408,7 @@
           <a:p>
             <a:fld id="{349BF3EA-1A78-4F07-BDC0-C8A1BD461199}" type="datetimeFigureOut">
               <a:rPr lang="en-US" smtClean="0"/>
-              <a:t>25-May-17</a:t>
+              <a:t>29-May-17</a:t>
             </a:fld>
             <a:endParaRPr lang="en-US"/>
           </a:p>
@@ -2783,7 +2786,7 @@
           <a:p>
             <a:fld id="{349BF3EA-1A78-4F07-BDC0-C8A1BD461199}" type="datetimeFigureOut">
               <a:rPr lang="en-US" smtClean="0"/>
-              <a:t>25-May-17</a:t>
+              <a:t>29-May-17</a:t>
             </a:fld>
             <a:endParaRPr lang="en-US"/>
           </a:p>
@@ -2912,7 +2915,7 @@
           <a:p>
             <a:fld id="{349BF3EA-1A78-4F07-BDC0-C8A1BD461199}" type="datetimeFigureOut">
               <a:rPr lang="en-US" smtClean="0"/>
-              <a:t>25-May-17</a:t>
+              <a:t>29-May-17</a:t>
             </a:fld>
             <a:endParaRPr lang="en-US"/>
           </a:p>
@@ -3114,7 +3117,7 @@
           <a:p>
             <a:fld id="{349BF3EA-1A78-4F07-BDC0-C8A1BD461199}" type="datetimeFigureOut">
               <a:rPr lang="en-US" smtClean="0"/>
-              <a:t>25-May-17</a:t>
+              <a:t>29-May-17</a:t>
             </a:fld>
             <a:endParaRPr lang="en-US"/>
           </a:p>
@@ -3360,7 +3363,7 @@
           <a:p>
             <a:fld id="{349BF3EA-1A78-4F07-BDC0-C8A1BD461199}" type="datetimeFigureOut">
               <a:rPr lang="en-US" smtClean="0"/>
-              <a:t>25-May-17</a:t>
+              <a:t>29-May-17</a:t>
             </a:fld>
             <a:endParaRPr lang="en-US"/>
           </a:p>
@@ -3862,7 +3865,7 @@
           <a:p>
             <a:fld id="{349BF3EA-1A78-4F07-BDC0-C8A1BD461199}" type="datetimeFigureOut">
               <a:rPr lang="en-US" smtClean="0"/>
-              <a:t>25-May-17</a:t>
+              <a:t>29-May-17</a:t>
             </a:fld>
             <a:endParaRPr lang="en-US"/>
           </a:p>
@@ -4393,10 +4396,52 @@
           <a:bodyPr/>
           <a:lstStyle/>
           <a:p>
+            <a:pPr>
+              <a:spcAft>
+                <a:spcPts val="1200"/>
+              </a:spcAft>
+            </a:pPr>
             <a:r>
               <a:rPr lang="en-US" dirty="0"/>
               <a:t>Decision Support Systems</a:t>
             </a:r>
+          </a:p>
+          <a:p>
+            <a:r>
+              <a:rPr lang="en-US" dirty="0" err="1"/>
+              <a:t>Emirhan</a:t>
+            </a:r>
+            <a:r>
+              <a:rPr lang="en-US" dirty="0"/>
+              <a:t> </a:t>
+            </a:r>
+            <a:r>
+              <a:rPr lang="en-US" dirty="0" err="1"/>
+              <a:t>Kutlu</a:t>
+            </a:r>
+            <a:r>
+              <a:rPr lang="en-US" dirty="0"/>
+              <a:t>, Lucie Labadie, </a:t>
+            </a:r>
+          </a:p>
+          <a:p>
+            <a:r>
+              <a:rPr lang="en-US" dirty="0"/>
+              <a:t>Sundeep Raj </a:t>
+            </a:r>
+            <a:r>
+              <a:rPr lang="en-US" dirty="0" err="1"/>
+              <a:t>Thummapudi</a:t>
+            </a:r>
+            <a:r>
+              <a:rPr lang="en-US" dirty="0"/>
+              <a:t>, Rosen </a:t>
+            </a:r>
+            <a:r>
+              <a:rPr lang="en-US" dirty="0" err="1"/>
+              <a:t>Sasov</a:t>
+            </a:r>
+            <a:endParaRPr lang="en-US" dirty="0"/>
           </a:p>
         </p:txBody>
       </p:sp>
@@ -4512,7 +4557,7 @@
           <a:p>
             <a:r>
               <a:rPr lang="en-US" dirty="0"/>
-              <a:t>Bot logic: Telegram Bot</a:t>
+              <a:t>Bot logic: Telegram Bot (Python module)</a:t>
             </a:r>
           </a:p>
           <a:p>
@@ -4726,6 +4771,29 @@
           <a:p>
             <a:r>
               <a:rPr lang="en-US" dirty="0"/>
+              <a:t>Could be adapted for mobile use </a:t>
+            </a:r>
+          </a:p>
+          <a:p>
+            <a:r>
+              <a:rPr lang="fr-FR" dirty="0"/>
+              <a:t>C</a:t>
+            </a:r>
+            <a:r>
+              <a:rPr lang="en-US" dirty="0" err="1"/>
+              <a:t>ould</a:t>
+            </a:r>
+            <a:r>
+              <a:rPr lang="en-US" dirty="0"/>
+              <a:t> be affined for professional use</a:t>
+            </a:r>
+          </a:p>
+          <a:p>
+            <a:endParaRPr lang="en-US" dirty="0"/>
+          </a:p>
+          <a:p>
+            <a:r>
+              <a:rPr lang="en-US" dirty="0"/>
               <a:t>First thought wanted to use Django </a:t>
             </a:r>
             <a:r>
@@ -4796,104 +4864,10 @@
             </a:r>
             <a:endParaRPr lang="en-US" dirty="0"/>
           </a:p>
-        </p:txBody>
-      </p:sp>
-      <p:sp>
-        <p:nvSpPr>
-          <p:cNvPr id="3" name="Title 2"/>
-          <p:cNvSpPr>
-            <a:spLocks noGrp="1"/>
-          </p:cNvSpPr>
-          <p:nvPr>
-            <p:ph type="title"/>
-          </p:nvPr>
-        </p:nvSpPr>
-        <p:spPr/>
-        <p:txBody>
-          <a:bodyPr/>
-          <a:lstStyle/>
           <a:p>
             <a:r>
               <a:rPr lang="en-US" dirty="0"/>
-              <a:t>Difficulties </a:t>
-            </a:r>
-          </a:p>
-        </p:txBody>
-      </p:sp>
-    </p:spTree>
-    <p:extLst>
-      <p:ext uri="{BB962C8B-B14F-4D97-AF65-F5344CB8AC3E}">
-        <p14:creationId xmlns:p14="http://schemas.microsoft.com/office/powerpoint/2010/main" val="2265463819"/>
-      </p:ext>
-    </p:extLst>
-  </p:cSld>
-  <p:clrMapOvr>
-    <a:masterClrMapping/>
-  </p:clrMapOvr>
-  <mc:AlternateContent xmlns:mc="http://schemas.openxmlformats.org/markup-compatibility/2006" xmlns:p14="http://schemas.microsoft.com/office/powerpoint/2010/main">
-    <mc:Choice Requires="p14">
-      <p:transition spd="med" p14:dur="700">
-        <p:fade/>
-      </p:transition>
-    </mc:Choice>
-    <mc:Fallback xmlns="">
-      <p:transition spd="med">
-        <p:fade/>
-      </p:transition>
-    </mc:Fallback>
-  </mc:AlternateContent>
-</p:sld>
-</file>
-
-<file path=ppt/slides/slide12.xml><?xml version="1.0" encoding="utf-8"?>
-<p:sld xmlns:a="http://schemas.openxmlformats.org/drawingml/2006/main" xmlns:r="http://schemas.openxmlformats.org/officeDocument/2006/relationships" xmlns:p="http://schemas.openxmlformats.org/presentationml/2006/main">
-  <p:cSld>
-    <p:spTree>
-      <p:nvGrpSpPr>
-        <p:cNvPr id="1" name=""/>
-        <p:cNvGrpSpPr/>
-        <p:nvPr/>
-      </p:nvGrpSpPr>
-      <p:grpSpPr>
-        <a:xfrm>
-          <a:off x="0" y="0"/>
-          <a:ext cx="0" cy="0"/>
-          <a:chOff x="0" y="0"/>
-          <a:chExt cx="0" cy="0"/>
-        </a:xfrm>
-      </p:grpSpPr>
-      <p:sp>
-        <p:nvSpPr>
-          <p:cNvPr id="2" name="Content Placeholder 1"/>
-          <p:cNvSpPr>
-            <a:spLocks noGrp="1"/>
-          </p:cNvSpPr>
-          <p:nvPr>
-            <p:ph sz="quarter" idx="1"/>
-          </p:nvPr>
-        </p:nvSpPr>
-        <p:spPr/>
-        <p:txBody>
-          <a:bodyPr/>
-          <a:lstStyle/>
-          <a:p>
-            <a:r>
-              <a:rPr lang="en-US" dirty="0"/>
-              <a:t>Could be adapted for mobile use </a:t>
-            </a:r>
-          </a:p>
-          <a:p>
-            <a:r>
-              <a:rPr lang="fr-FR" dirty="0"/>
-              <a:t>C</a:t>
-            </a:r>
-            <a:r>
-              <a:rPr lang="en-US" dirty="0" err="1"/>
-              <a:t>ould</a:t>
-            </a:r>
-            <a:r>
-              <a:rPr lang="en-US" dirty="0"/>
-              <a:t> be affined for professional use </a:t>
+              <a:t>(challenge) </a:t>
             </a:r>
           </a:p>
           <a:p>
@@ -5550,11 +5524,11 @@
           <a:p>
             <a:r>
               <a:rPr lang="fr-FR" dirty="0" err="1"/>
-              <a:t>Knowledge</a:t>
+              <a:t>Knowledge-driven</a:t>
             </a:r>
             <a:r>
               <a:rPr lang="fr-FR" dirty="0"/>
-              <a:t>-drive DSS</a:t>
+              <a:t> DSS</a:t>
             </a:r>
           </a:p>
           <a:p>

</xml_diff>